<commit_message>
WO3196 H2 drop measurements and IV curve fits
</commit_message>
<xml_diff>
--- a/0117_1703_WO3196_full_IV_curve/IV curve of WO3196 Dev2.pptx
+++ b/0117_1703_WO3196_full_IV_curve/IV curve of WO3196 Dev2.pptx
@@ -6,6 +6,8 @@
   </p:sldMasterIdLst>
   <p:sldIdLst>
     <p:sldId id="257" r:id="rId2"/>
+    <p:sldId id="258" r:id="rId3"/>
+    <p:sldId id="259" r:id="rId4"/>
   </p:sldIdLst>
   <p:sldSz cx="12192000" cy="6858000"/>
   <p:notesSz cx="6858000" cy="9144000"/>
@@ -129,7 +131,7 @@
           <p:cNvPr id="2" name="Title 1">
             <a:extLst>
               <a:ext uri="{FF2B5EF4-FFF2-40B4-BE49-F238E27FC236}">
-                <a16:creationId xmlns:a16="http://schemas.microsoft.com/office/drawing/2014/main" id="{7573D08E-0FC4-40D0-881A-5F4D2F45A58D}"/>
+                <a16:creationId xmlns:a16="http://schemas.microsoft.com/office/drawing/2014/main" xmlns="" id="{7573D08E-0FC4-40D0-881A-5F4D2F45A58D}"/>
               </a:ext>
             </a:extLst>
           </p:cNvPr>
@@ -167,7 +169,7 @@
           <p:cNvPr id="3" name="Subtitle 2">
             <a:extLst>
               <a:ext uri="{FF2B5EF4-FFF2-40B4-BE49-F238E27FC236}">
-                <a16:creationId xmlns:a16="http://schemas.microsoft.com/office/drawing/2014/main" id="{4050D4E0-4C32-4672-8C6D-8A0C93C6E278}"/>
+                <a16:creationId xmlns:a16="http://schemas.microsoft.com/office/drawing/2014/main" xmlns="" id="{4050D4E0-4C32-4672-8C6D-8A0C93C6E278}"/>
               </a:ext>
             </a:extLst>
           </p:cNvPr>
@@ -238,7 +240,7 @@
           <p:cNvPr id="4" name="Date Placeholder 3">
             <a:extLst>
               <a:ext uri="{FF2B5EF4-FFF2-40B4-BE49-F238E27FC236}">
-                <a16:creationId xmlns:a16="http://schemas.microsoft.com/office/drawing/2014/main" id="{1E09C93B-9F71-4F2E-A9E3-C88D910D285D}"/>
+                <a16:creationId xmlns:a16="http://schemas.microsoft.com/office/drawing/2014/main" xmlns="" id="{1E09C93B-9F71-4F2E-A9E3-C88D910D285D}"/>
               </a:ext>
             </a:extLst>
           </p:cNvPr>
@@ -267,7 +269,7 @@
           <p:cNvPr id="5" name="Footer Placeholder 4">
             <a:extLst>
               <a:ext uri="{FF2B5EF4-FFF2-40B4-BE49-F238E27FC236}">
-                <a16:creationId xmlns:a16="http://schemas.microsoft.com/office/drawing/2014/main" id="{9031403F-49E8-45A7-807D-9290C5BBA6D3}"/>
+                <a16:creationId xmlns:a16="http://schemas.microsoft.com/office/drawing/2014/main" xmlns="" id="{9031403F-49E8-45A7-807D-9290C5BBA6D3}"/>
               </a:ext>
             </a:extLst>
           </p:cNvPr>
@@ -292,7 +294,7 @@
           <p:cNvPr id="6" name="Slide Number Placeholder 5">
             <a:extLst>
               <a:ext uri="{FF2B5EF4-FFF2-40B4-BE49-F238E27FC236}">
-                <a16:creationId xmlns:a16="http://schemas.microsoft.com/office/drawing/2014/main" id="{16BD258E-8D82-4DC4-B4D4-2E78B89CEC07}"/>
+                <a16:creationId xmlns:a16="http://schemas.microsoft.com/office/drawing/2014/main" xmlns="" id="{16BD258E-8D82-4DC4-B4D4-2E78B89CEC07}"/>
               </a:ext>
             </a:extLst>
           </p:cNvPr>
@@ -351,7 +353,7 @@
           <p:cNvPr id="2" name="Title 1">
             <a:extLst>
               <a:ext uri="{FF2B5EF4-FFF2-40B4-BE49-F238E27FC236}">
-                <a16:creationId xmlns:a16="http://schemas.microsoft.com/office/drawing/2014/main" id="{D275DC5F-3735-4660-AAB2-00131E63C24F}"/>
+                <a16:creationId xmlns:a16="http://schemas.microsoft.com/office/drawing/2014/main" xmlns="" id="{D275DC5F-3735-4660-AAB2-00131E63C24F}"/>
               </a:ext>
             </a:extLst>
           </p:cNvPr>
@@ -380,7 +382,7 @@
           <p:cNvPr id="3" name="Vertical Text Placeholder 2">
             <a:extLst>
               <a:ext uri="{FF2B5EF4-FFF2-40B4-BE49-F238E27FC236}">
-                <a16:creationId xmlns:a16="http://schemas.microsoft.com/office/drawing/2014/main" id="{7F5E22D6-8208-4EFB-A929-E9BC17653D31}"/>
+                <a16:creationId xmlns:a16="http://schemas.microsoft.com/office/drawing/2014/main" xmlns="" id="{7F5E22D6-8208-4EFB-A929-E9BC17653D31}"/>
               </a:ext>
             </a:extLst>
           </p:cNvPr>
@@ -438,7 +440,7 @@
           <p:cNvPr id="4" name="Date Placeholder 3">
             <a:extLst>
               <a:ext uri="{FF2B5EF4-FFF2-40B4-BE49-F238E27FC236}">
-                <a16:creationId xmlns:a16="http://schemas.microsoft.com/office/drawing/2014/main" id="{4261D4E0-7720-48BB-8DD9-D02FAFF5EBAD}"/>
+                <a16:creationId xmlns:a16="http://schemas.microsoft.com/office/drawing/2014/main" xmlns="" id="{4261D4E0-7720-48BB-8DD9-D02FAFF5EBAD}"/>
               </a:ext>
             </a:extLst>
           </p:cNvPr>
@@ -467,7 +469,7 @@
           <p:cNvPr id="5" name="Footer Placeholder 4">
             <a:extLst>
               <a:ext uri="{FF2B5EF4-FFF2-40B4-BE49-F238E27FC236}">
-                <a16:creationId xmlns:a16="http://schemas.microsoft.com/office/drawing/2014/main" id="{055A6670-C387-41F9-A400-67E578247518}"/>
+                <a16:creationId xmlns:a16="http://schemas.microsoft.com/office/drawing/2014/main" xmlns="" id="{055A6670-C387-41F9-A400-67E578247518}"/>
               </a:ext>
             </a:extLst>
           </p:cNvPr>
@@ -492,7 +494,7 @@
           <p:cNvPr id="6" name="Slide Number Placeholder 5">
             <a:extLst>
               <a:ext uri="{FF2B5EF4-FFF2-40B4-BE49-F238E27FC236}">
-                <a16:creationId xmlns:a16="http://schemas.microsoft.com/office/drawing/2014/main" id="{EFBD93FF-44E1-4BC8-9CAC-44610010313E}"/>
+                <a16:creationId xmlns:a16="http://schemas.microsoft.com/office/drawing/2014/main" xmlns="" id="{EFBD93FF-44E1-4BC8-9CAC-44610010313E}"/>
               </a:ext>
             </a:extLst>
           </p:cNvPr>
@@ -551,7 +553,7 @@
           <p:cNvPr id="2" name="Vertical Title 1">
             <a:extLst>
               <a:ext uri="{FF2B5EF4-FFF2-40B4-BE49-F238E27FC236}">
-                <a16:creationId xmlns:a16="http://schemas.microsoft.com/office/drawing/2014/main" id="{EDCB22C8-8BD1-4C71-831F-35B6332D981B}"/>
+                <a16:creationId xmlns:a16="http://schemas.microsoft.com/office/drawing/2014/main" xmlns="" id="{EDCB22C8-8BD1-4C71-831F-35B6332D981B}"/>
               </a:ext>
             </a:extLst>
           </p:cNvPr>
@@ -585,7 +587,7 @@
           <p:cNvPr id="3" name="Vertical Text Placeholder 2">
             <a:extLst>
               <a:ext uri="{FF2B5EF4-FFF2-40B4-BE49-F238E27FC236}">
-                <a16:creationId xmlns:a16="http://schemas.microsoft.com/office/drawing/2014/main" id="{56E844B5-FD24-4155-82A2-8FD94CA01F80}"/>
+                <a16:creationId xmlns:a16="http://schemas.microsoft.com/office/drawing/2014/main" xmlns="" id="{56E844B5-FD24-4155-82A2-8FD94CA01F80}"/>
               </a:ext>
             </a:extLst>
           </p:cNvPr>
@@ -648,7 +650,7 @@
           <p:cNvPr id="4" name="Date Placeholder 3">
             <a:extLst>
               <a:ext uri="{FF2B5EF4-FFF2-40B4-BE49-F238E27FC236}">
-                <a16:creationId xmlns:a16="http://schemas.microsoft.com/office/drawing/2014/main" id="{B8F4555E-E3F2-4620-AB45-C0F8FF40BE56}"/>
+                <a16:creationId xmlns:a16="http://schemas.microsoft.com/office/drawing/2014/main" xmlns="" id="{B8F4555E-E3F2-4620-AB45-C0F8FF40BE56}"/>
               </a:ext>
             </a:extLst>
           </p:cNvPr>
@@ -677,7 +679,7 @@
           <p:cNvPr id="5" name="Footer Placeholder 4">
             <a:extLst>
               <a:ext uri="{FF2B5EF4-FFF2-40B4-BE49-F238E27FC236}">
-                <a16:creationId xmlns:a16="http://schemas.microsoft.com/office/drawing/2014/main" id="{572ECBA2-9006-4866-B4EE-3160DB1F590A}"/>
+                <a16:creationId xmlns:a16="http://schemas.microsoft.com/office/drawing/2014/main" xmlns="" id="{572ECBA2-9006-4866-B4EE-3160DB1F590A}"/>
               </a:ext>
             </a:extLst>
           </p:cNvPr>
@@ -702,7 +704,7 @@
           <p:cNvPr id="6" name="Slide Number Placeholder 5">
             <a:extLst>
               <a:ext uri="{FF2B5EF4-FFF2-40B4-BE49-F238E27FC236}">
-                <a16:creationId xmlns:a16="http://schemas.microsoft.com/office/drawing/2014/main" id="{02211D0D-028A-4EFB-94F3-C12EA7D3D798}"/>
+                <a16:creationId xmlns:a16="http://schemas.microsoft.com/office/drawing/2014/main" xmlns="" id="{02211D0D-028A-4EFB-94F3-C12EA7D3D798}"/>
               </a:ext>
             </a:extLst>
           </p:cNvPr>
@@ -761,7 +763,7 @@
           <p:cNvPr id="2" name="Title 1">
             <a:extLst>
               <a:ext uri="{FF2B5EF4-FFF2-40B4-BE49-F238E27FC236}">
-                <a16:creationId xmlns:a16="http://schemas.microsoft.com/office/drawing/2014/main" id="{7F992821-89E8-43C6-B652-579832CEE194}"/>
+                <a16:creationId xmlns:a16="http://schemas.microsoft.com/office/drawing/2014/main" xmlns="" id="{7F992821-89E8-43C6-B652-579832CEE194}"/>
               </a:ext>
             </a:extLst>
           </p:cNvPr>
@@ -790,7 +792,7 @@
           <p:cNvPr id="3" name="Content Placeholder 2">
             <a:extLst>
               <a:ext uri="{FF2B5EF4-FFF2-40B4-BE49-F238E27FC236}">
-                <a16:creationId xmlns:a16="http://schemas.microsoft.com/office/drawing/2014/main" id="{6F665ED0-B668-4F37-8236-C68AE63E20C9}"/>
+                <a16:creationId xmlns:a16="http://schemas.microsoft.com/office/drawing/2014/main" xmlns="" id="{6F665ED0-B668-4F37-8236-C68AE63E20C9}"/>
               </a:ext>
             </a:extLst>
           </p:cNvPr>
@@ -848,7 +850,7 @@
           <p:cNvPr id="4" name="Date Placeholder 3">
             <a:extLst>
               <a:ext uri="{FF2B5EF4-FFF2-40B4-BE49-F238E27FC236}">
-                <a16:creationId xmlns:a16="http://schemas.microsoft.com/office/drawing/2014/main" id="{0F0727A8-3414-4EF0-AC05-2B199771C70E}"/>
+                <a16:creationId xmlns:a16="http://schemas.microsoft.com/office/drawing/2014/main" xmlns="" id="{0F0727A8-3414-4EF0-AC05-2B199771C70E}"/>
               </a:ext>
             </a:extLst>
           </p:cNvPr>
@@ -877,7 +879,7 @@
           <p:cNvPr id="5" name="Footer Placeholder 4">
             <a:extLst>
               <a:ext uri="{FF2B5EF4-FFF2-40B4-BE49-F238E27FC236}">
-                <a16:creationId xmlns:a16="http://schemas.microsoft.com/office/drawing/2014/main" id="{BD8C59E9-C70B-4D2F-9212-FB143212A6E9}"/>
+                <a16:creationId xmlns:a16="http://schemas.microsoft.com/office/drawing/2014/main" xmlns="" id="{BD8C59E9-C70B-4D2F-9212-FB143212A6E9}"/>
               </a:ext>
             </a:extLst>
           </p:cNvPr>
@@ -902,7 +904,7 @@
           <p:cNvPr id="6" name="Slide Number Placeholder 5">
             <a:extLst>
               <a:ext uri="{FF2B5EF4-FFF2-40B4-BE49-F238E27FC236}">
-                <a16:creationId xmlns:a16="http://schemas.microsoft.com/office/drawing/2014/main" id="{740E1E14-B453-47B6-8EC3-DBE070B7F0D4}"/>
+                <a16:creationId xmlns:a16="http://schemas.microsoft.com/office/drawing/2014/main" xmlns="" id="{740E1E14-B453-47B6-8EC3-DBE070B7F0D4}"/>
               </a:ext>
             </a:extLst>
           </p:cNvPr>
@@ -961,7 +963,7 @@
           <p:cNvPr id="2" name="Title 1">
             <a:extLst>
               <a:ext uri="{FF2B5EF4-FFF2-40B4-BE49-F238E27FC236}">
-                <a16:creationId xmlns:a16="http://schemas.microsoft.com/office/drawing/2014/main" id="{EDD1ADFE-639B-4820-B5D2-CC6E39840DA9}"/>
+                <a16:creationId xmlns:a16="http://schemas.microsoft.com/office/drawing/2014/main" xmlns="" id="{EDD1ADFE-639B-4820-B5D2-CC6E39840DA9}"/>
               </a:ext>
             </a:extLst>
           </p:cNvPr>
@@ -999,7 +1001,7 @@
           <p:cNvPr id="3" name="Text Placeholder 2">
             <a:extLst>
               <a:ext uri="{FF2B5EF4-FFF2-40B4-BE49-F238E27FC236}">
-                <a16:creationId xmlns:a16="http://schemas.microsoft.com/office/drawing/2014/main" id="{27714317-1D73-43C2-8B8D-7FA4257D7984}"/>
+                <a16:creationId xmlns:a16="http://schemas.microsoft.com/office/drawing/2014/main" xmlns="" id="{27714317-1D73-43C2-8B8D-7FA4257D7984}"/>
               </a:ext>
             </a:extLst>
           </p:cNvPr>
@@ -1124,7 +1126,7 @@
           <p:cNvPr id="4" name="Date Placeholder 3">
             <a:extLst>
               <a:ext uri="{FF2B5EF4-FFF2-40B4-BE49-F238E27FC236}">
-                <a16:creationId xmlns:a16="http://schemas.microsoft.com/office/drawing/2014/main" id="{41361AEA-4034-49B7-A0DD-7F789EC4635B}"/>
+                <a16:creationId xmlns:a16="http://schemas.microsoft.com/office/drawing/2014/main" xmlns="" id="{41361AEA-4034-49B7-A0DD-7F789EC4635B}"/>
               </a:ext>
             </a:extLst>
           </p:cNvPr>
@@ -1153,7 +1155,7 @@
           <p:cNvPr id="5" name="Footer Placeholder 4">
             <a:extLst>
               <a:ext uri="{FF2B5EF4-FFF2-40B4-BE49-F238E27FC236}">
-                <a16:creationId xmlns:a16="http://schemas.microsoft.com/office/drawing/2014/main" id="{0C840E2A-A4D9-4405-96EE-3D456127EA20}"/>
+                <a16:creationId xmlns:a16="http://schemas.microsoft.com/office/drawing/2014/main" xmlns="" id="{0C840E2A-A4D9-4405-96EE-3D456127EA20}"/>
               </a:ext>
             </a:extLst>
           </p:cNvPr>
@@ -1178,7 +1180,7 @@
           <p:cNvPr id="6" name="Slide Number Placeholder 5">
             <a:extLst>
               <a:ext uri="{FF2B5EF4-FFF2-40B4-BE49-F238E27FC236}">
-                <a16:creationId xmlns:a16="http://schemas.microsoft.com/office/drawing/2014/main" id="{A9BF3F56-8BAC-4EE1-935C-E93E88B4E23E}"/>
+                <a16:creationId xmlns:a16="http://schemas.microsoft.com/office/drawing/2014/main" xmlns="" id="{A9BF3F56-8BAC-4EE1-935C-E93E88B4E23E}"/>
               </a:ext>
             </a:extLst>
           </p:cNvPr>
@@ -1237,7 +1239,7 @@
           <p:cNvPr id="2" name="Title 1">
             <a:extLst>
               <a:ext uri="{FF2B5EF4-FFF2-40B4-BE49-F238E27FC236}">
-                <a16:creationId xmlns:a16="http://schemas.microsoft.com/office/drawing/2014/main" id="{C168D7F9-ED62-4DF3-8AE9-FCB57E71891D}"/>
+                <a16:creationId xmlns:a16="http://schemas.microsoft.com/office/drawing/2014/main" xmlns="" id="{C168D7F9-ED62-4DF3-8AE9-FCB57E71891D}"/>
               </a:ext>
             </a:extLst>
           </p:cNvPr>
@@ -1266,7 +1268,7 @@
           <p:cNvPr id="3" name="Content Placeholder 2">
             <a:extLst>
               <a:ext uri="{FF2B5EF4-FFF2-40B4-BE49-F238E27FC236}">
-                <a16:creationId xmlns:a16="http://schemas.microsoft.com/office/drawing/2014/main" id="{EDFFFDA6-C1DF-4047-B51D-1D7A192E2ACB}"/>
+                <a16:creationId xmlns:a16="http://schemas.microsoft.com/office/drawing/2014/main" xmlns="" id="{EDFFFDA6-C1DF-4047-B51D-1D7A192E2ACB}"/>
               </a:ext>
             </a:extLst>
           </p:cNvPr>
@@ -1329,7 +1331,7 @@
           <p:cNvPr id="4" name="Content Placeholder 3">
             <a:extLst>
               <a:ext uri="{FF2B5EF4-FFF2-40B4-BE49-F238E27FC236}">
-                <a16:creationId xmlns:a16="http://schemas.microsoft.com/office/drawing/2014/main" id="{3F532EB6-084E-4A31-97FB-6B0A3ACF3F1E}"/>
+                <a16:creationId xmlns:a16="http://schemas.microsoft.com/office/drawing/2014/main" xmlns="" id="{3F532EB6-084E-4A31-97FB-6B0A3ACF3F1E}"/>
               </a:ext>
             </a:extLst>
           </p:cNvPr>
@@ -1392,7 +1394,7 @@
           <p:cNvPr id="5" name="Date Placeholder 4">
             <a:extLst>
               <a:ext uri="{FF2B5EF4-FFF2-40B4-BE49-F238E27FC236}">
-                <a16:creationId xmlns:a16="http://schemas.microsoft.com/office/drawing/2014/main" id="{4CED29F0-4B56-4383-B310-30E894ED1E0C}"/>
+                <a16:creationId xmlns:a16="http://schemas.microsoft.com/office/drawing/2014/main" xmlns="" id="{4CED29F0-4B56-4383-B310-30E894ED1E0C}"/>
               </a:ext>
             </a:extLst>
           </p:cNvPr>
@@ -1421,7 +1423,7 @@
           <p:cNvPr id="6" name="Footer Placeholder 5">
             <a:extLst>
               <a:ext uri="{FF2B5EF4-FFF2-40B4-BE49-F238E27FC236}">
-                <a16:creationId xmlns:a16="http://schemas.microsoft.com/office/drawing/2014/main" id="{ED95D50A-6237-4F74-AF41-D353026BAA83}"/>
+                <a16:creationId xmlns:a16="http://schemas.microsoft.com/office/drawing/2014/main" xmlns="" id="{ED95D50A-6237-4F74-AF41-D353026BAA83}"/>
               </a:ext>
             </a:extLst>
           </p:cNvPr>
@@ -1446,7 +1448,7 @@
           <p:cNvPr id="7" name="Slide Number Placeholder 6">
             <a:extLst>
               <a:ext uri="{FF2B5EF4-FFF2-40B4-BE49-F238E27FC236}">
-                <a16:creationId xmlns:a16="http://schemas.microsoft.com/office/drawing/2014/main" id="{CC02DD59-69E5-4D1D-9ADC-2FBFB5C7231B}"/>
+                <a16:creationId xmlns:a16="http://schemas.microsoft.com/office/drawing/2014/main" xmlns="" id="{CC02DD59-69E5-4D1D-9ADC-2FBFB5C7231B}"/>
               </a:ext>
             </a:extLst>
           </p:cNvPr>
@@ -1505,7 +1507,7 @@
           <p:cNvPr id="2" name="Title 1">
             <a:extLst>
               <a:ext uri="{FF2B5EF4-FFF2-40B4-BE49-F238E27FC236}">
-                <a16:creationId xmlns:a16="http://schemas.microsoft.com/office/drawing/2014/main" id="{5C19E461-11EC-4714-92E8-0AEF852D8169}"/>
+                <a16:creationId xmlns:a16="http://schemas.microsoft.com/office/drawing/2014/main" xmlns="" id="{5C19E461-11EC-4714-92E8-0AEF852D8169}"/>
               </a:ext>
             </a:extLst>
           </p:cNvPr>
@@ -1539,7 +1541,7 @@
           <p:cNvPr id="3" name="Text Placeholder 2">
             <a:extLst>
               <a:ext uri="{FF2B5EF4-FFF2-40B4-BE49-F238E27FC236}">
-                <a16:creationId xmlns:a16="http://schemas.microsoft.com/office/drawing/2014/main" id="{E5995397-E404-4D02-A638-F820E0AE5DB5}"/>
+                <a16:creationId xmlns:a16="http://schemas.microsoft.com/office/drawing/2014/main" xmlns="" id="{E5995397-E404-4D02-A638-F820E0AE5DB5}"/>
               </a:ext>
             </a:extLst>
           </p:cNvPr>
@@ -1610,7 +1612,7 @@
           <p:cNvPr id="4" name="Content Placeholder 3">
             <a:extLst>
               <a:ext uri="{FF2B5EF4-FFF2-40B4-BE49-F238E27FC236}">
-                <a16:creationId xmlns:a16="http://schemas.microsoft.com/office/drawing/2014/main" id="{8B21FA05-BD90-4FDD-B040-E00468E84DFF}"/>
+                <a16:creationId xmlns:a16="http://schemas.microsoft.com/office/drawing/2014/main" xmlns="" id="{8B21FA05-BD90-4FDD-B040-E00468E84DFF}"/>
               </a:ext>
             </a:extLst>
           </p:cNvPr>
@@ -1673,7 +1675,7 @@
           <p:cNvPr id="5" name="Text Placeholder 4">
             <a:extLst>
               <a:ext uri="{FF2B5EF4-FFF2-40B4-BE49-F238E27FC236}">
-                <a16:creationId xmlns:a16="http://schemas.microsoft.com/office/drawing/2014/main" id="{49EFD09B-AEB9-45E5-8D8C-C89FA2817E81}"/>
+                <a16:creationId xmlns:a16="http://schemas.microsoft.com/office/drawing/2014/main" xmlns="" id="{49EFD09B-AEB9-45E5-8D8C-C89FA2817E81}"/>
               </a:ext>
             </a:extLst>
           </p:cNvPr>
@@ -1744,7 +1746,7 @@
           <p:cNvPr id="6" name="Content Placeholder 5">
             <a:extLst>
               <a:ext uri="{FF2B5EF4-FFF2-40B4-BE49-F238E27FC236}">
-                <a16:creationId xmlns:a16="http://schemas.microsoft.com/office/drawing/2014/main" id="{7077B01B-A57A-496C-909A-5146DA9CA211}"/>
+                <a16:creationId xmlns:a16="http://schemas.microsoft.com/office/drawing/2014/main" xmlns="" id="{7077B01B-A57A-496C-909A-5146DA9CA211}"/>
               </a:ext>
             </a:extLst>
           </p:cNvPr>
@@ -1807,7 +1809,7 @@
           <p:cNvPr id="7" name="Date Placeholder 6">
             <a:extLst>
               <a:ext uri="{FF2B5EF4-FFF2-40B4-BE49-F238E27FC236}">
-                <a16:creationId xmlns:a16="http://schemas.microsoft.com/office/drawing/2014/main" id="{B68A789C-4D9B-4CF0-A7E1-59771209C411}"/>
+                <a16:creationId xmlns:a16="http://schemas.microsoft.com/office/drawing/2014/main" xmlns="" id="{B68A789C-4D9B-4CF0-A7E1-59771209C411}"/>
               </a:ext>
             </a:extLst>
           </p:cNvPr>
@@ -1836,7 +1838,7 @@
           <p:cNvPr id="8" name="Footer Placeholder 7">
             <a:extLst>
               <a:ext uri="{FF2B5EF4-FFF2-40B4-BE49-F238E27FC236}">
-                <a16:creationId xmlns:a16="http://schemas.microsoft.com/office/drawing/2014/main" id="{160A8ED9-68F9-4F29-911E-F0F4D313F1E1}"/>
+                <a16:creationId xmlns:a16="http://schemas.microsoft.com/office/drawing/2014/main" xmlns="" id="{160A8ED9-68F9-4F29-911E-F0F4D313F1E1}"/>
               </a:ext>
             </a:extLst>
           </p:cNvPr>
@@ -1861,7 +1863,7 @@
           <p:cNvPr id="9" name="Slide Number Placeholder 8">
             <a:extLst>
               <a:ext uri="{FF2B5EF4-FFF2-40B4-BE49-F238E27FC236}">
-                <a16:creationId xmlns:a16="http://schemas.microsoft.com/office/drawing/2014/main" id="{EB62306F-2980-4A24-B16C-96C829E6EEF0}"/>
+                <a16:creationId xmlns:a16="http://schemas.microsoft.com/office/drawing/2014/main" xmlns="" id="{EB62306F-2980-4A24-B16C-96C829E6EEF0}"/>
               </a:ext>
             </a:extLst>
           </p:cNvPr>
@@ -1920,7 +1922,7 @@
           <p:cNvPr id="2" name="Title 1">
             <a:extLst>
               <a:ext uri="{FF2B5EF4-FFF2-40B4-BE49-F238E27FC236}">
-                <a16:creationId xmlns:a16="http://schemas.microsoft.com/office/drawing/2014/main" id="{AC914BA9-E4F5-4E73-A86A-77F55D0E076F}"/>
+                <a16:creationId xmlns:a16="http://schemas.microsoft.com/office/drawing/2014/main" xmlns="" id="{AC914BA9-E4F5-4E73-A86A-77F55D0E076F}"/>
               </a:ext>
             </a:extLst>
           </p:cNvPr>
@@ -1949,7 +1951,7 @@
           <p:cNvPr id="3" name="Date Placeholder 2">
             <a:extLst>
               <a:ext uri="{FF2B5EF4-FFF2-40B4-BE49-F238E27FC236}">
-                <a16:creationId xmlns:a16="http://schemas.microsoft.com/office/drawing/2014/main" id="{4AC92B46-AF9A-4C62-A955-FB350E198412}"/>
+                <a16:creationId xmlns:a16="http://schemas.microsoft.com/office/drawing/2014/main" xmlns="" id="{4AC92B46-AF9A-4C62-A955-FB350E198412}"/>
               </a:ext>
             </a:extLst>
           </p:cNvPr>
@@ -1978,7 +1980,7 @@
           <p:cNvPr id="4" name="Footer Placeholder 3">
             <a:extLst>
               <a:ext uri="{FF2B5EF4-FFF2-40B4-BE49-F238E27FC236}">
-                <a16:creationId xmlns:a16="http://schemas.microsoft.com/office/drawing/2014/main" id="{97692D28-25C7-4E3A-85CC-D7AFCA61B4B4}"/>
+                <a16:creationId xmlns:a16="http://schemas.microsoft.com/office/drawing/2014/main" xmlns="" id="{97692D28-25C7-4E3A-85CC-D7AFCA61B4B4}"/>
               </a:ext>
             </a:extLst>
           </p:cNvPr>
@@ -2003,7 +2005,7 @@
           <p:cNvPr id="5" name="Slide Number Placeholder 4">
             <a:extLst>
               <a:ext uri="{FF2B5EF4-FFF2-40B4-BE49-F238E27FC236}">
-                <a16:creationId xmlns:a16="http://schemas.microsoft.com/office/drawing/2014/main" id="{8C738527-7F5E-43B1-B2C8-A8A33F3F5B9D}"/>
+                <a16:creationId xmlns:a16="http://schemas.microsoft.com/office/drawing/2014/main" xmlns="" id="{8C738527-7F5E-43B1-B2C8-A8A33F3F5B9D}"/>
               </a:ext>
             </a:extLst>
           </p:cNvPr>
@@ -2062,7 +2064,7 @@
           <p:cNvPr id="2" name="Date Placeholder 1">
             <a:extLst>
               <a:ext uri="{FF2B5EF4-FFF2-40B4-BE49-F238E27FC236}">
-                <a16:creationId xmlns:a16="http://schemas.microsoft.com/office/drawing/2014/main" id="{1870E8D5-BDD7-40B5-91A5-57404F01C160}"/>
+                <a16:creationId xmlns:a16="http://schemas.microsoft.com/office/drawing/2014/main" xmlns="" id="{1870E8D5-BDD7-40B5-91A5-57404F01C160}"/>
               </a:ext>
             </a:extLst>
           </p:cNvPr>
@@ -2091,7 +2093,7 @@
           <p:cNvPr id="3" name="Footer Placeholder 2">
             <a:extLst>
               <a:ext uri="{FF2B5EF4-FFF2-40B4-BE49-F238E27FC236}">
-                <a16:creationId xmlns:a16="http://schemas.microsoft.com/office/drawing/2014/main" id="{2F9736DC-206C-488F-8BD6-6AF15F42FECC}"/>
+                <a16:creationId xmlns:a16="http://schemas.microsoft.com/office/drawing/2014/main" xmlns="" id="{2F9736DC-206C-488F-8BD6-6AF15F42FECC}"/>
               </a:ext>
             </a:extLst>
           </p:cNvPr>
@@ -2116,7 +2118,7 @@
           <p:cNvPr id="4" name="Slide Number Placeholder 3">
             <a:extLst>
               <a:ext uri="{FF2B5EF4-FFF2-40B4-BE49-F238E27FC236}">
-                <a16:creationId xmlns:a16="http://schemas.microsoft.com/office/drawing/2014/main" id="{F20AC7E6-F4EB-406A-9451-673EA3F83C09}"/>
+                <a16:creationId xmlns:a16="http://schemas.microsoft.com/office/drawing/2014/main" xmlns="" id="{F20AC7E6-F4EB-406A-9451-673EA3F83C09}"/>
               </a:ext>
             </a:extLst>
           </p:cNvPr>
@@ -2175,7 +2177,7 @@
           <p:cNvPr id="2" name="Title 1">
             <a:extLst>
               <a:ext uri="{FF2B5EF4-FFF2-40B4-BE49-F238E27FC236}">
-                <a16:creationId xmlns:a16="http://schemas.microsoft.com/office/drawing/2014/main" id="{709094DD-68C2-484F-BBA1-3B9D7651F2F9}"/>
+                <a16:creationId xmlns:a16="http://schemas.microsoft.com/office/drawing/2014/main" xmlns="" id="{709094DD-68C2-484F-BBA1-3B9D7651F2F9}"/>
               </a:ext>
             </a:extLst>
           </p:cNvPr>
@@ -2213,7 +2215,7 @@
           <p:cNvPr id="3" name="Content Placeholder 2">
             <a:extLst>
               <a:ext uri="{FF2B5EF4-FFF2-40B4-BE49-F238E27FC236}">
-                <a16:creationId xmlns:a16="http://schemas.microsoft.com/office/drawing/2014/main" id="{DA0895B7-E3F8-4A32-9619-E227607FDFF6}"/>
+                <a16:creationId xmlns:a16="http://schemas.microsoft.com/office/drawing/2014/main" xmlns="" id="{DA0895B7-E3F8-4A32-9619-E227607FDFF6}"/>
               </a:ext>
             </a:extLst>
           </p:cNvPr>
@@ -2304,7 +2306,7 @@
           <p:cNvPr id="4" name="Text Placeholder 3">
             <a:extLst>
               <a:ext uri="{FF2B5EF4-FFF2-40B4-BE49-F238E27FC236}">
-                <a16:creationId xmlns:a16="http://schemas.microsoft.com/office/drawing/2014/main" id="{ACA9545E-BB33-4EFF-AF29-0AA9F87F8E1F}"/>
+                <a16:creationId xmlns:a16="http://schemas.microsoft.com/office/drawing/2014/main" xmlns="" id="{ACA9545E-BB33-4EFF-AF29-0AA9F87F8E1F}"/>
               </a:ext>
             </a:extLst>
           </p:cNvPr>
@@ -2375,7 +2377,7 @@
           <p:cNvPr id="5" name="Date Placeholder 4">
             <a:extLst>
               <a:ext uri="{FF2B5EF4-FFF2-40B4-BE49-F238E27FC236}">
-                <a16:creationId xmlns:a16="http://schemas.microsoft.com/office/drawing/2014/main" id="{6DFD8ECC-3EE3-48FE-948B-BBC986D4CCF1}"/>
+                <a16:creationId xmlns:a16="http://schemas.microsoft.com/office/drawing/2014/main" xmlns="" id="{6DFD8ECC-3EE3-48FE-948B-BBC986D4CCF1}"/>
               </a:ext>
             </a:extLst>
           </p:cNvPr>
@@ -2404,7 +2406,7 @@
           <p:cNvPr id="6" name="Footer Placeholder 5">
             <a:extLst>
               <a:ext uri="{FF2B5EF4-FFF2-40B4-BE49-F238E27FC236}">
-                <a16:creationId xmlns:a16="http://schemas.microsoft.com/office/drawing/2014/main" id="{FDB69384-9BD1-404B-AE79-5B46EF8D90A9}"/>
+                <a16:creationId xmlns:a16="http://schemas.microsoft.com/office/drawing/2014/main" xmlns="" id="{FDB69384-9BD1-404B-AE79-5B46EF8D90A9}"/>
               </a:ext>
             </a:extLst>
           </p:cNvPr>
@@ -2429,7 +2431,7 @@
           <p:cNvPr id="7" name="Slide Number Placeholder 6">
             <a:extLst>
               <a:ext uri="{FF2B5EF4-FFF2-40B4-BE49-F238E27FC236}">
-                <a16:creationId xmlns:a16="http://schemas.microsoft.com/office/drawing/2014/main" id="{691926C3-526A-4BB5-8226-49E55DA19BF6}"/>
+                <a16:creationId xmlns:a16="http://schemas.microsoft.com/office/drawing/2014/main" xmlns="" id="{691926C3-526A-4BB5-8226-49E55DA19BF6}"/>
               </a:ext>
             </a:extLst>
           </p:cNvPr>
@@ -2488,7 +2490,7 @@
           <p:cNvPr id="2" name="Title 1">
             <a:extLst>
               <a:ext uri="{FF2B5EF4-FFF2-40B4-BE49-F238E27FC236}">
-                <a16:creationId xmlns:a16="http://schemas.microsoft.com/office/drawing/2014/main" id="{856F75A6-6E61-41F5-9BEB-72DC193F2166}"/>
+                <a16:creationId xmlns:a16="http://schemas.microsoft.com/office/drawing/2014/main" xmlns="" id="{856F75A6-6E61-41F5-9BEB-72DC193F2166}"/>
               </a:ext>
             </a:extLst>
           </p:cNvPr>
@@ -2526,7 +2528,7 @@
           <p:cNvPr id="3" name="Picture Placeholder 2">
             <a:extLst>
               <a:ext uri="{FF2B5EF4-FFF2-40B4-BE49-F238E27FC236}">
-                <a16:creationId xmlns:a16="http://schemas.microsoft.com/office/drawing/2014/main" id="{2D82D3DE-9C49-450D-B797-E0986CFF3005}"/>
+                <a16:creationId xmlns:a16="http://schemas.microsoft.com/office/drawing/2014/main" xmlns="" id="{2D82D3DE-9C49-450D-B797-E0986CFF3005}"/>
               </a:ext>
             </a:extLst>
           </p:cNvPr>
@@ -2593,7 +2595,7 @@
           <p:cNvPr id="4" name="Text Placeholder 3">
             <a:extLst>
               <a:ext uri="{FF2B5EF4-FFF2-40B4-BE49-F238E27FC236}">
-                <a16:creationId xmlns:a16="http://schemas.microsoft.com/office/drawing/2014/main" id="{92A9E064-A027-4811-A11C-E5605E064AEB}"/>
+                <a16:creationId xmlns:a16="http://schemas.microsoft.com/office/drawing/2014/main" xmlns="" id="{92A9E064-A027-4811-A11C-E5605E064AEB}"/>
               </a:ext>
             </a:extLst>
           </p:cNvPr>
@@ -2664,7 +2666,7 @@
           <p:cNvPr id="5" name="Date Placeholder 4">
             <a:extLst>
               <a:ext uri="{FF2B5EF4-FFF2-40B4-BE49-F238E27FC236}">
-                <a16:creationId xmlns:a16="http://schemas.microsoft.com/office/drawing/2014/main" id="{AFA0CCF6-3FA8-48E2-ACF7-C8A4486AB496}"/>
+                <a16:creationId xmlns:a16="http://schemas.microsoft.com/office/drawing/2014/main" xmlns="" id="{AFA0CCF6-3FA8-48E2-ACF7-C8A4486AB496}"/>
               </a:ext>
             </a:extLst>
           </p:cNvPr>
@@ -2693,7 +2695,7 @@
           <p:cNvPr id="6" name="Footer Placeholder 5">
             <a:extLst>
               <a:ext uri="{FF2B5EF4-FFF2-40B4-BE49-F238E27FC236}">
-                <a16:creationId xmlns:a16="http://schemas.microsoft.com/office/drawing/2014/main" id="{B1007C44-31F5-4F86-B1C8-E77A3F1EBE5A}"/>
+                <a16:creationId xmlns:a16="http://schemas.microsoft.com/office/drawing/2014/main" xmlns="" id="{B1007C44-31F5-4F86-B1C8-E77A3F1EBE5A}"/>
               </a:ext>
             </a:extLst>
           </p:cNvPr>
@@ -2718,7 +2720,7 @@
           <p:cNvPr id="7" name="Slide Number Placeholder 6">
             <a:extLst>
               <a:ext uri="{FF2B5EF4-FFF2-40B4-BE49-F238E27FC236}">
-                <a16:creationId xmlns:a16="http://schemas.microsoft.com/office/drawing/2014/main" id="{A6E08752-F15C-4E39-A494-542F85D077BF}"/>
+                <a16:creationId xmlns:a16="http://schemas.microsoft.com/office/drawing/2014/main" xmlns="" id="{A6E08752-F15C-4E39-A494-542F85D077BF}"/>
               </a:ext>
             </a:extLst>
           </p:cNvPr>
@@ -2782,7 +2784,7 @@
           <p:cNvPr id="2" name="Title Placeholder 1">
             <a:extLst>
               <a:ext uri="{FF2B5EF4-FFF2-40B4-BE49-F238E27FC236}">
-                <a16:creationId xmlns:a16="http://schemas.microsoft.com/office/drawing/2014/main" id="{BC881083-574A-46C1-A73C-2712991E8CFD}"/>
+                <a16:creationId xmlns:a16="http://schemas.microsoft.com/office/drawing/2014/main" xmlns="" id="{BC881083-574A-46C1-A73C-2712991E8CFD}"/>
               </a:ext>
             </a:extLst>
           </p:cNvPr>
@@ -2821,7 +2823,7 @@
           <p:cNvPr id="3" name="Text Placeholder 2">
             <a:extLst>
               <a:ext uri="{FF2B5EF4-FFF2-40B4-BE49-F238E27FC236}">
-                <a16:creationId xmlns:a16="http://schemas.microsoft.com/office/drawing/2014/main" id="{B7F71526-0E47-449D-8000-05A5A3BA143D}"/>
+                <a16:creationId xmlns:a16="http://schemas.microsoft.com/office/drawing/2014/main" xmlns="" id="{B7F71526-0E47-449D-8000-05A5A3BA143D}"/>
               </a:ext>
             </a:extLst>
           </p:cNvPr>
@@ -2889,7 +2891,7 @@
           <p:cNvPr id="4" name="Date Placeholder 3">
             <a:extLst>
               <a:ext uri="{FF2B5EF4-FFF2-40B4-BE49-F238E27FC236}">
-                <a16:creationId xmlns:a16="http://schemas.microsoft.com/office/drawing/2014/main" id="{F75234A3-5121-4ECB-A136-D6575688F178}"/>
+                <a16:creationId xmlns:a16="http://schemas.microsoft.com/office/drawing/2014/main" xmlns="" id="{F75234A3-5121-4ECB-A136-D6575688F178}"/>
               </a:ext>
             </a:extLst>
           </p:cNvPr>
@@ -2936,7 +2938,7 @@
           <p:cNvPr id="5" name="Footer Placeholder 4">
             <a:extLst>
               <a:ext uri="{FF2B5EF4-FFF2-40B4-BE49-F238E27FC236}">
-                <a16:creationId xmlns:a16="http://schemas.microsoft.com/office/drawing/2014/main" id="{0B08CA06-66B3-4CB9-9895-76035F9895FC}"/>
+                <a16:creationId xmlns:a16="http://schemas.microsoft.com/office/drawing/2014/main" xmlns="" id="{0B08CA06-66B3-4CB9-9895-76035F9895FC}"/>
               </a:ext>
             </a:extLst>
           </p:cNvPr>
@@ -2979,7 +2981,7 @@
           <p:cNvPr id="6" name="Slide Number Placeholder 5">
             <a:extLst>
               <a:ext uri="{FF2B5EF4-FFF2-40B4-BE49-F238E27FC236}">
-                <a16:creationId xmlns:a16="http://schemas.microsoft.com/office/drawing/2014/main" id="{8ED75AC7-6A8B-44A8-A62D-4C9711F6FC22}"/>
+                <a16:creationId xmlns:a16="http://schemas.microsoft.com/office/drawing/2014/main" xmlns="" id="{8ED75AC7-6A8B-44A8-A62D-4C9711F6FC22}"/>
               </a:ext>
             </a:extLst>
           </p:cNvPr>
@@ -3347,7 +3349,7 @@
           <p:cNvPr id="2" name="Title 1">
             <a:extLst>
               <a:ext uri="{FF2B5EF4-FFF2-40B4-BE49-F238E27FC236}">
-                <a16:creationId xmlns:a16="http://schemas.microsoft.com/office/drawing/2014/main" id="{B7D93CF6-0F9D-42C8-A17F-C40E0868CC1B}"/>
+                <a16:creationId xmlns:a16="http://schemas.microsoft.com/office/drawing/2014/main" xmlns="" id="{B7D93CF6-0F9D-42C8-A17F-C40E0868CC1B}"/>
               </a:ext>
             </a:extLst>
           </p:cNvPr>
@@ -3358,7 +3360,12 @@
             <p:ph type="title"/>
           </p:nvPr>
         </p:nvSpPr>
-        <p:spPr/>
+        <p:spPr>
+          <a:xfrm>
+            <a:off x="318782" y="103868"/>
+            <a:ext cx="10515600" cy="1325563"/>
+          </a:xfrm>
+        </p:spPr>
         <p:txBody>
           <a:bodyPr/>
           <a:lstStyle/>
@@ -3375,7 +3382,7 @@
           <p:cNvPr id="3" name="Content Placeholder 2">
             <a:extLst>
               <a:ext uri="{FF2B5EF4-FFF2-40B4-BE49-F238E27FC236}">
-                <a16:creationId xmlns:a16="http://schemas.microsoft.com/office/drawing/2014/main" id="{09EE9F8D-704F-43E5-ADA8-58EB977790E6}"/>
+                <a16:creationId xmlns:a16="http://schemas.microsoft.com/office/drawing/2014/main" xmlns="" id="{09EE9F8D-704F-43E5-ADA8-58EB977790E6}"/>
               </a:ext>
             </a:extLst>
           </p:cNvPr>
@@ -3388,7 +3395,7 @@
         </p:nvSpPr>
         <p:spPr>
           <a:xfrm>
-            <a:off x="838200" y="1825625"/>
+            <a:off x="258535" y="1410511"/>
             <a:ext cx="10515600" cy="531681"/>
           </a:xfrm>
         </p:spPr>
@@ -3411,7 +3418,7 @@
           <p:cNvPr id="4" name="TextBox 3">
             <a:extLst>
               <a:ext uri="{FF2B5EF4-FFF2-40B4-BE49-F238E27FC236}">
-                <a16:creationId xmlns:a16="http://schemas.microsoft.com/office/drawing/2014/main" id="{91C64646-2665-4DCE-AE02-535AA34C54FD}"/>
+                <a16:creationId xmlns:a16="http://schemas.microsoft.com/office/drawing/2014/main" xmlns="" id="{91C64646-2665-4DCE-AE02-535AA34C54FD}"/>
               </a:ext>
             </a:extLst>
           </p:cNvPr>
@@ -3523,10 +3530,588 @@
           </a:p>
         </p:txBody>
       </p:sp>
+      <p:pic>
+        <p:nvPicPr>
+          <p:cNvPr id="1026" name="Picture 2" descr="D:\Rijk\MEP_control_software\0117_1703_WO3196_full_IV_curve\iv_curve_plusminus.png"/>
+          <p:cNvPicPr>
+            <a:picLocks noChangeAspect="1" noChangeArrowheads="1"/>
+          </p:cNvPicPr>
+          <p:nvPr/>
+        </p:nvPicPr>
+        <p:blipFill>
+          <a:blip r:embed="rId2">
+            <a:extLst>
+              <a:ext uri="{28A0092B-C50C-407E-A947-70E740481C1C}">
+                <a14:useLocalDpi xmlns:a14="http://schemas.microsoft.com/office/drawing/2010/main" val="0"/>
+              </a:ext>
+            </a:extLst>
+          </a:blip>
+          <a:srcRect/>
+          <a:stretch>
+            <a:fillRect/>
+          </a:stretch>
+        </p:blipFill>
+        <p:spPr bwMode="auto">
+          <a:xfrm>
+            <a:off x="6070600" y="1889578"/>
+            <a:ext cx="5851525" cy="4352925"/>
+          </a:xfrm>
+          <a:prstGeom prst="rect">
+            <a:avLst/>
+          </a:prstGeom>
+          <a:noFill/>
+          <a:extLst>
+            <a:ext uri="{909E8E84-426E-40DD-AFC4-6F175D3DCCD1}">
+              <a14:hiddenFill xmlns:a14="http://schemas.microsoft.com/office/drawing/2010/main">
+                <a:solidFill>
+                  <a:srgbClr val="FFFFFF"/>
+                </a:solidFill>
+              </a14:hiddenFill>
+            </a:ext>
+          </a:extLst>
+        </p:spPr>
+      </p:pic>
+      <p:pic>
+        <p:nvPicPr>
+          <p:cNvPr id="1027" name="Picture 3" descr="D:\Rijk\MEP_control_software\0117_1703_WO3196_full_IV_curve\figures\0117_1703_WO3196_full_IV_curve_current.PNG"/>
+          <p:cNvPicPr>
+            <a:picLocks noChangeAspect="1" noChangeArrowheads="1"/>
+          </p:cNvPicPr>
+          <p:nvPr/>
+        </p:nvPicPr>
+        <p:blipFill>
+          <a:blip r:embed="rId3">
+            <a:extLst>
+              <a:ext uri="{28A0092B-C50C-407E-A947-70E740481C1C}">
+                <a14:useLocalDpi xmlns:a14="http://schemas.microsoft.com/office/drawing/2010/main" val="0"/>
+              </a:ext>
+            </a:extLst>
+          </a:blip>
+          <a:srcRect/>
+          <a:stretch>
+            <a:fillRect/>
+          </a:stretch>
+        </p:blipFill>
+        <p:spPr bwMode="auto">
+          <a:xfrm>
+            <a:off x="2406676" y="2600550"/>
+            <a:ext cx="3907266" cy="2930979"/>
+          </a:xfrm>
+          <a:prstGeom prst="rect">
+            <a:avLst/>
+          </a:prstGeom>
+          <a:noFill/>
+          <a:extLst>
+            <a:ext uri="{909E8E84-426E-40DD-AFC4-6F175D3DCCD1}">
+              <a14:hiddenFill xmlns:a14="http://schemas.microsoft.com/office/drawing/2010/main">
+                <a:solidFill>
+                  <a:srgbClr val="FFFFFF"/>
+                </a:solidFill>
+              </a14:hiddenFill>
+            </a:ext>
+          </a:extLst>
+        </p:spPr>
+      </p:pic>
     </p:spTree>
     <p:extLst>
       <p:ext uri="{BB962C8B-B14F-4D97-AF65-F5344CB8AC3E}">
         <p14:creationId xmlns:p14="http://schemas.microsoft.com/office/powerpoint/2010/main" val="245740620"/>
+      </p:ext>
+    </p:extLst>
+  </p:cSld>
+  <p:clrMapOvr>
+    <a:masterClrMapping/>
+  </p:clrMapOvr>
+</p:sld>
+</file>
+
+<file path=ppt/slides/slide2.xml><?xml version="1.0" encoding="utf-8"?>
+<p:sld xmlns:a="http://schemas.openxmlformats.org/drawingml/2006/main" xmlns:r="http://schemas.openxmlformats.org/officeDocument/2006/relationships" xmlns:p="http://schemas.openxmlformats.org/presentationml/2006/main">
+  <p:cSld>
+    <p:spTree>
+      <p:nvGrpSpPr>
+        <p:cNvPr id="1" name=""/>
+        <p:cNvGrpSpPr/>
+        <p:nvPr/>
+      </p:nvGrpSpPr>
+      <p:grpSpPr>
+        <a:xfrm>
+          <a:off x="0" y="0"/>
+          <a:ext cx="0" cy="0"/>
+          <a:chOff x="0" y="0"/>
+          <a:chExt cx="0" cy="0"/>
+        </a:xfrm>
+      </p:grpSpPr>
+      <p:sp>
+        <p:nvSpPr>
+          <p:cNvPr id="2" name="Title 1"/>
+          <p:cNvSpPr>
+            <a:spLocks noGrp="1"/>
+          </p:cNvSpPr>
+          <p:nvPr>
+            <p:ph type="title"/>
+          </p:nvPr>
+        </p:nvSpPr>
+        <p:spPr/>
+        <p:txBody>
+          <a:bodyPr/>
+          <a:lstStyle/>
+          <a:p>
+            <a:r>
+              <a:rPr lang="en-GB" dirty="0" smtClean="0"/>
+              <a:t>Difference between IV curves</a:t>
+            </a:r>
+            <a:endParaRPr lang="nl-NL" dirty="0"/>
+          </a:p>
+        </p:txBody>
+      </p:sp>
+      <p:sp>
+        <p:nvSpPr>
+          <p:cNvPr id="3" name="Content Placeholder 2"/>
+          <p:cNvSpPr>
+            <a:spLocks noGrp="1"/>
+          </p:cNvSpPr>
+          <p:nvPr>
+            <p:ph idx="1"/>
+          </p:nvPr>
+        </p:nvSpPr>
+        <p:spPr>
+          <a:xfrm>
+            <a:off x="821871" y="2699203"/>
+            <a:ext cx="5260521" cy="4351338"/>
+          </a:xfrm>
+        </p:spPr>
+        <p:txBody>
+          <a:bodyPr/>
+          <a:lstStyle/>
+          <a:p>
+            <a:r>
+              <a:rPr lang="en-GB" sz="2000" dirty="0" smtClean="0"/>
+              <a:t>No clear relation</a:t>
+            </a:r>
+            <a:r>
+              <a:rPr lang="nl-NL" sz="2000" dirty="0" smtClean="0"/>
+              <a:t>, </a:t>
+            </a:r>
+            <a:r>
+              <a:rPr lang="nl-NL" sz="2000" dirty="0" err="1" smtClean="0"/>
+              <a:t>except</a:t>
+            </a:r>
+            <a:r>
+              <a:rPr lang="nl-NL" sz="2000" dirty="0" smtClean="0"/>
+              <a:t> </a:t>
+            </a:r>
+            <a:r>
+              <a:rPr lang="nl-NL" sz="2000" dirty="0" err="1" smtClean="0"/>
+              <a:t>that</a:t>
+            </a:r>
+            <a:r>
+              <a:rPr lang="nl-NL" sz="2000" dirty="0" smtClean="0"/>
+              <a:t> points </a:t>
+            </a:r>
+            <a:r>
+              <a:rPr lang="nl-NL" sz="2000" dirty="0" err="1" smtClean="0"/>
+              <a:t>fartest</a:t>
+            </a:r>
+            <a:r>
+              <a:rPr lang="nl-NL" sz="2000" dirty="0" smtClean="0"/>
+              <a:t> apart in time have </a:t>
+            </a:r>
+            <a:r>
+              <a:rPr lang="nl-NL" sz="2000" dirty="0" err="1" smtClean="0"/>
+              <a:t>the</a:t>
+            </a:r>
+            <a:r>
+              <a:rPr lang="nl-NL" sz="2000" dirty="0" smtClean="0"/>
+              <a:t> </a:t>
+            </a:r>
+            <a:r>
+              <a:rPr lang="nl-NL" sz="2000" dirty="0" err="1" smtClean="0"/>
+              <a:t>largest</a:t>
+            </a:r>
+            <a:r>
+              <a:rPr lang="nl-NL" sz="2000" dirty="0" smtClean="0"/>
+              <a:t> </a:t>
+            </a:r>
+            <a:r>
+              <a:rPr lang="nl-NL" sz="2000" dirty="0" err="1" smtClean="0"/>
+              <a:t>difference</a:t>
+            </a:r>
+            <a:r>
+              <a:rPr lang="nl-NL" sz="2000" dirty="0"/>
+              <a:t> </a:t>
+            </a:r>
+            <a:r>
+              <a:rPr lang="nl-NL" sz="2000" dirty="0" smtClean="0"/>
+              <a:t>(</a:t>
+            </a:r>
+            <a:r>
+              <a:rPr lang="nl-NL" sz="2000" dirty="0" err="1" smtClean="0"/>
+              <a:t>calculated</a:t>
+            </a:r>
+            <a:r>
+              <a:rPr lang="nl-NL" sz="2000" dirty="0" smtClean="0"/>
+              <a:t> </a:t>
+            </a:r>
+            <a:r>
+              <a:rPr lang="nl-NL" sz="2000" dirty="0" err="1" smtClean="0"/>
+              <a:t>by</a:t>
+            </a:r>
+            <a:r>
+              <a:rPr lang="nl-NL" sz="2000" dirty="0" smtClean="0"/>
+              <a:t> flipping </a:t>
+            </a:r>
+            <a:r>
+              <a:rPr lang="nl-NL" sz="2000" dirty="0" err="1" smtClean="0"/>
+              <a:t>voltage_minus</a:t>
+            </a:r>
+            <a:r>
+              <a:rPr lang="nl-NL" sz="2000" dirty="0" smtClean="0"/>
+              <a:t> </a:t>
+            </a:r>
+            <a:r>
+              <a:rPr lang="nl-NL" sz="2000" dirty="0" err="1" smtClean="0"/>
+              <a:t>around</a:t>
+            </a:r>
+            <a:r>
+              <a:rPr lang="nl-NL" sz="2000" dirty="0" smtClean="0"/>
+              <a:t> </a:t>
+            </a:r>
+            <a:r>
+              <a:rPr lang="nl-NL" sz="2000" dirty="0" err="1" smtClean="0"/>
+              <a:t>and</a:t>
+            </a:r>
+            <a:r>
+              <a:rPr lang="nl-NL" sz="2000" dirty="0" smtClean="0"/>
+              <a:t> </a:t>
+            </a:r>
+            <a:r>
+              <a:rPr lang="nl-NL" sz="2000" dirty="0" err="1" smtClean="0"/>
+              <a:t>subtracting</a:t>
+            </a:r>
+            <a:r>
+              <a:rPr lang="nl-NL" sz="2000" dirty="0" smtClean="0"/>
+              <a:t> </a:t>
+            </a:r>
+            <a:r>
+              <a:rPr lang="nl-NL" sz="2000" dirty="0" err="1" smtClean="0"/>
+              <a:t>it</a:t>
+            </a:r>
+            <a:r>
+              <a:rPr lang="nl-NL" sz="2000" dirty="0" smtClean="0"/>
+              <a:t> </a:t>
+            </a:r>
+            <a:r>
+              <a:rPr lang="nl-NL" sz="2000" dirty="0" err="1" smtClean="0"/>
+              <a:t>from</a:t>
+            </a:r>
+            <a:r>
+              <a:rPr lang="nl-NL" sz="2000" dirty="0" smtClean="0"/>
+              <a:t> </a:t>
+            </a:r>
+            <a:r>
+              <a:rPr lang="nl-NL" sz="2000" dirty="0" err="1" smtClean="0"/>
+              <a:t>voltage_plus</a:t>
+            </a:r>
+            <a:r>
+              <a:rPr lang="nl-NL" sz="2000" dirty="0" smtClean="0"/>
+              <a:t>)</a:t>
+            </a:r>
+          </a:p>
+          <a:p>
+            <a:endParaRPr lang="en-GB" dirty="0" smtClean="0"/>
+          </a:p>
+        </p:txBody>
+      </p:sp>
+      <p:pic>
+        <p:nvPicPr>
+          <p:cNvPr id="2050" name="Picture 2" descr="D:\Rijk\MEP_control_software\0117_1703_WO3196_full_IV_curve\iv_curve_difference_plusminus.png"/>
+          <p:cNvPicPr>
+            <a:picLocks noChangeAspect="1" noChangeArrowheads="1"/>
+          </p:cNvPicPr>
+          <p:nvPr/>
+        </p:nvPicPr>
+        <p:blipFill>
+          <a:blip r:embed="rId2">
+            <a:extLst>
+              <a:ext uri="{28A0092B-C50C-407E-A947-70E740481C1C}">
+                <a14:useLocalDpi xmlns:a14="http://schemas.microsoft.com/office/drawing/2010/main" val="0"/>
+              </a:ext>
+            </a:extLst>
+          </a:blip>
+          <a:srcRect/>
+          <a:stretch>
+            <a:fillRect/>
+          </a:stretch>
+        </p:blipFill>
+        <p:spPr bwMode="auto">
+          <a:xfrm>
+            <a:off x="5972628" y="1864632"/>
+            <a:ext cx="5851525" cy="4352925"/>
+          </a:xfrm>
+          <a:prstGeom prst="rect">
+            <a:avLst/>
+          </a:prstGeom>
+          <a:noFill/>
+          <a:extLst>
+            <a:ext uri="{909E8E84-426E-40DD-AFC4-6F175D3DCCD1}">
+              <a14:hiddenFill xmlns:a14="http://schemas.microsoft.com/office/drawing/2010/main">
+                <a:solidFill>
+                  <a:srgbClr val="FFFFFF"/>
+                </a:solidFill>
+              </a14:hiddenFill>
+            </a:ext>
+          </a:extLst>
+        </p:spPr>
+      </p:pic>
+    </p:spTree>
+    <p:extLst>
+      <p:ext uri="{BB962C8B-B14F-4D97-AF65-F5344CB8AC3E}">
+        <p14:creationId xmlns:p14="http://schemas.microsoft.com/office/powerpoint/2010/main" val="3721677147"/>
+      </p:ext>
+    </p:extLst>
+  </p:cSld>
+  <p:clrMapOvr>
+    <a:masterClrMapping/>
+  </p:clrMapOvr>
+</p:sld>
+</file>
+
+<file path=ppt/slides/slide3.xml><?xml version="1.0" encoding="utf-8"?>
+<p:sld xmlns:a="http://schemas.openxmlformats.org/drawingml/2006/main" xmlns:r="http://schemas.openxmlformats.org/officeDocument/2006/relationships" xmlns:p="http://schemas.openxmlformats.org/presentationml/2006/main">
+  <p:cSld>
+    <p:spTree>
+      <p:nvGrpSpPr>
+        <p:cNvPr id="1" name=""/>
+        <p:cNvGrpSpPr/>
+        <p:nvPr/>
+      </p:nvGrpSpPr>
+      <p:grpSpPr>
+        <a:xfrm>
+          <a:off x="0" y="0"/>
+          <a:ext cx="0" cy="0"/>
+          <a:chOff x="0" y="0"/>
+          <a:chExt cx="0" cy="0"/>
+        </a:xfrm>
+      </p:grpSpPr>
+      <p:sp>
+        <p:nvSpPr>
+          <p:cNvPr id="2" name="Title 1"/>
+          <p:cNvSpPr>
+            <a:spLocks noGrp="1"/>
+          </p:cNvSpPr>
+          <p:nvPr>
+            <p:ph type="title"/>
+          </p:nvPr>
+        </p:nvSpPr>
+        <p:spPr/>
+        <p:txBody>
+          <a:bodyPr/>
+          <a:lstStyle/>
+          <a:p>
+            <a:r>
+              <a:rPr lang="en-GB" dirty="0" smtClean="0"/>
+              <a:t>Knee location</a:t>
+            </a:r>
+            <a:endParaRPr lang="nl-NL" dirty="0"/>
+          </a:p>
+        </p:txBody>
+      </p:sp>
+      <p:sp>
+        <p:nvSpPr>
+          <p:cNvPr id="3" name="Content Placeholder 2"/>
+          <p:cNvSpPr>
+            <a:spLocks noGrp="1"/>
+          </p:cNvSpPr>
+          <p:nvPr>
+            <p:ph idx="1"/>
+          </p:nvPr>
+        </p:nvSpPr>
+        <p:spPr/>
+        <p:txBody>
+          <a:bodyPr/>
+          <a:lstStyle/>
+          <a:p>
+            <a:r>
+              <a:rPr lang="en-GB" dirty="0" smtClean="0"/>
+              <a:t>Similar for both curves and current values</a:t>
+            </a:r>
+            <a:r>
+              <a:rPr lang="nl-NL" dirty="0" smtClean="0"/>
+              <a:t> at </a:t>
+            </a:r>
+            <a:r>
+              <a:rPr lang="nl-NL" dirty="0" err="1" smtClean="0"/>
+              <a:t>approximately</a:t>
+            </a:r>
+            <a:r>
+              <a:rPr lang="nl-NL" dirty="0" smtClean="0"/>
+              <a:t> (+/- 1.5V </a:t>
+            </a:r>
+            <a:r>
+              <a:rPr lang="nl-NL" dirty="0" err="1" smtClean="0"/>
+              <a:t>and</a:t>
+            </a:r>
+            <a:r>
+              <a:rPr lang="nl-NL" dirty="0" smtClean="0"/>
+              <a:t> +/-1.5E-7 A, or </a:t>
+            </a:r>
+            <a:r>
+              <a:rPr lang="nl-NL" dirty="0" err="1" smtClean="0"/>
+              <a:t>the</a:t>
+            </a:r>
+            <a:r>
+              <a:rPr lang="nl-NL" dirty="0" smtClean="0"/>
+              <a:t> 15th </a:t>
+            </a:r>
+            <a:r>
+              <a:rPr lang="nl-NL" dirty="0" err="1" smtClean="0"/>
+              <a:t>value</a:t>
+            </a:r>
+            <a:r>
+              <a:rPr lang="nl-NL" dirty="0" smtClean="0"/>
+              <a:t> of </a:t>
+            </a:r>
+            <a:r>
+              <a:rPr lang="nl-NL" dirty="0" err="1" smtClean="0"/>
+              <a:t>the</a:t>
+            </a:r>
+            <a:r>
+              <a:rPr lang="nl-NL" dirty="0" smtClean="0"/>
+              <a:t> array)</a:t>
+            </a:r>
+          </a:p>
+          <a:p>
+            <a:endParaRPr lang="en-GB" dirty="0" smtClean="0"/>
+          </a:p>
+        </p:txBody>
+      </p:sp>
+      <p:pic>
+        <p:nvPicPr>
+          <p:cNvPr id="4" name="Picture 2" descr="D:\Rijk\MEP_control_software\0117_1703_WO3196_full_IV_curve\iv_curve_plusminus.png"/>
+          <p:cNvPicPr>
+            <a:picLocks noChangeAspect="1" noChangeArrowheads="1"/>
+          </p:cNvPicPr>
+          <p:nvPr/>
+        </p:nvPicPr>
+        <p:blipFill>
+          <a:blip r:embed="rId2">
+            <a:extLst>
+              <a:ext uri="{28A0092B-C50C-407E-A947-70E740481C1C}">
+                <a14:useLocalDpi xmlns:a14="http://schemas.microsoft.com/office/drawing/2010/main" val="0"/>
+              </a:ext>
+            </a:extLst>
+          </a:blip>
+          <a:srcRect/>
+          <a:stretch>
+            <a:fillRect/>
+          </a:stretch>
+        </p:blipFill>
+        <p:spPr bwMode="auto">
+          <a:xfrm>
+            <a:off x="1102178" y="3022923"/>
+            <a:ext cx="4492625" cy="3342045"/>
+          </a:xfrm>
+          <a:prstGeom prst="rect">
+            <a:avLst/>
+          </a:prstGeom>
+          <a:noFill/>
+          <a:extLst>
+            <a:ext uri="{909E8E84-426E-40DD-AFC4-6F175D3DCCD1}">
+              <a14:hiddenFill xmlns:a14="http://schemas.microsoft.com/office/drawing/2010/main">
+                <a:solidFill>
+                  <a:srgbClr val="FFFFFF"/>
+                </a:solidFill>
+              </a14:hiddenFill>
+            </a:ext>
+          </a:extLst>
+        </p:spPr>
+      </p:pic>
+      <p:pic>
+        <p:nvPicPr>
+          <p:cNvPr id="3074" name="Picture 2" descr="D:\Rijk\MEP_control_software\0117_1703_WO3196_full_IV_curve\iv_curve_linear.png"/>
+          <p:cNvPicPr>
+            <a:picLocks noChangeAspect="1" noChangeArrowheads="1"/>
+          </p:cNvPicPr>
+          <p:nvPr/>
+        </p:nvPicPr>
+        <p:blipFill>
+          <a:blip r:embed="rId3">
+            <a:extLst>
+              <a:ext uri="{28A0092B-C50C-407E-A947-70E740481C1C}">
+                <a14:useLocalDpi xmlns:a14="http://schemas.microsoft.com/office/drawing/2010/main" val="0"/>
+              </a:ext>
+            </a:extLst>
+          </a:blip>
+          <a:srcRect/>
+          <a:stretch>
+            <a:fillRect/>
+          </a:stretch>
+        </p:blipFill>
+        <p:spPr bwMode="auto">
+          <a:xfrm>
+            <a:off x="7234636" y="3209405"/>
+            <a:ext cx="3991256" cy="2969079"/>
+          </a:xfrm>
+          <a:prstGeom prst="rect">
+            <a:avLst/>
+          </a:prstGeom>
+          <a:noFill/>
+          <a:extLst>
+            <a:ext uri="{909E8E84-426E-40DD-AFC4-6F175D3DCCD1}">
+              <a14:hiddenFill xmlns:a14="http://schemas.microsoft.com/office/drawing/2010/main">
+                <a:solidFill>
+                  <a:srgbClr val="FFFFFF"/>
+                </a:solidFill>
+              </a14:hiddenFill>
+            </a:ext>
+          </a:extLst>
+        </p:spPr>
+      </p:pic>
+      <p:sp>
+        <p:nvSpPr>
+          <p:cNvPr id="5" name="Right Arrow 4"/>
+          <p:cNvSpPr/>
+          <p:nvPr/>
+        </p:nvSpPr>
+        <p:spPr>
+          <a:xfrm>
+            <a:off x="5690507" y="4693944"/>
+            <a:ext cx="628650" cy="408735"/>
+          </a:xfrm>
+          <a:prstGeom prst="rightArrow">
+            <a:avLst/>
+          </a:prstGeom>
+        </p:spPr>
+        <p:style>
+          <a:lnRef idx="2">
+            <a:schemeClr val="accent1">
+              <a:shade val="50000"/>
+            </a:schemeClr>
+          </a:lnRef>
+          <a:fillRef idx="1">
+            <a:schemeClr val="accent1"/>
+          </a:fillRef>
+          <a:effectRef idx="0">
+            <a:schemeClr val="accent1"/>
+          </a:effectRef>
+          <a:fontRef idx="minor">
+            <a:schemeClr val="lt1"/>
+          </a:fontRef>
+        </p:style>
+        <p:txBody>
+          <a:bodyPr rtlCol="0" anchor="ctr"/>
+          <a:lstStyle/>
+          <a:p>
+            <a:pPr algn="ctr"/>
+            <a:endParaRPr lang="nl-NL"/>
+          </a:p>
+        </p:txBody>
+      </p:sp>
+    </p:spTree>
+    <p:extLst>
+      <p:ext uri="{BB962C8B-B14F-4D97-AF65-F5344CB8AC3E}">
+        <p14:creationId xmlns:p14="http://schemas.microsoft.com/office/powerpoint/2010/main" val="2509227639"/>
       </p:ext>
     </p:extLst>
   </p:cSld>
@@ -3825,7 +4410,7 @@
   <a:extraClrSchemeLst/>
   <a:extLst>
     <a:ext uri="{05A4C25C-085E-4340-85A3-A5531E510DB2}">
-      <thm15:themeFamily xmlns:thm15="http://schemas.microsoft.com/office/thememl/2012/main" name="Office Theme" id="{62F939B6-93AF-4DB8-9C6B-D6C7DFDC589F}" vid="{4A3C46E8-61CC-4603-A589-7422A47A8E4A}"/>
+      <thm15:themeFamily xmlns:thm15="http://schemas.microsoft.com/office/thememl/2012/main" xmlns="" name="Office Theme" id="{62F939B6-93AF-4DB8-9C6B-D6C7DFDC589F}" vid="{4A3C46E8-61CC-4603-A589-7422A47A8E4A}"/>
     </a:ext>
   </a:extLst>
 </a:theme>

</xml_diff>